<commit_message>
Added timetable to ppt
</commit_message>
<xml_diff>
--- a/Iteratie 1/PresentatieIteratie1Group03.pptx
+++ b/Iteratie 1/PresentatieIteratie1Group03.pptx
@@ -221,7 +221,7 @@
           <a:p>
             <a:fld id="{DEE8A487-D36E-4470-8771-B8133C9D26D4}" type="datetimeFigureOut">
               <a:rPr lang="nl-BE" smtClean="0"/>
-              <a:t>14/03/16</a:t>
+              <a:t>15/03/2016</a:t>
             </a:fld>
             <a:endParaRPr lang="nl-BE"/>
           </a:p>
@@ -380,7 +380,7 @@
           <a:p>
             <a:fld id="{214D5328-8A8B-4507-A018-9575DDE3653B}" type="slidenum">
               <a:rPr lang="nl-BE" smtClean="0"/>
-              <a:t>‹nr.›</a:t>
+              <a:t>‹#›</a:t>
             </a:fld>
             <a:endParaRPr lang="nl-BE"/>
           </a:p>
@@ -811,19 +811,11 @@
           <a:p>
             <a:r>
               <a:rPr lang="nl-BE" dirty="0" smtClean="0"/>
-              <a:t>TODO</a:t>
-            </a:r>
-            <a:r>
-              <a:rPr lang="nl-BE" dirty="0" smtClean="0"/>
-              <a:t>?</a:t>
+              <a:t>TODO?</a:t>
             </a:r>
             <a:r>
               <a:rPr lang="nl-BE" baseline="0" dirty="0" smtClean="0"/>
-              <a:t>   Tekstvak met uitleg Test strategy? (White box testing + mocking</a:t>
-            </a:r>
-            <a:r>
-              <a:rPr lang="nl-BE" baseline="0" dirty="0" smtClean="0"/>
-              <a:t>)</a:t>
+              <a:t>   Tekstvak met uitleg Test strategy? (White box testing + mocking)</a:t>
             </a:r>
           </a:p>
           <a:p>
@@ -1169,11 +1161,7 @@
           <a:p>
             <a:r>
               <a:rPr lang="nl-BE" baseline="0" dirty="0" smtClean="0"/>
-              <a:t>Notice: No dependencies from Model to UI</a:t>
-            </a:r>
-            <a:r>
-              <a:rPr lang="nl-BE" baseline="0" dirty="0" smtClean="0"/>
-              <a:t>.</a:t>
+              <a:t>Notice: No dependencies from Model to UI.</a:t>
             </a:r>
           </a:p>
           <a:p>
@@ -1181,7 +1169,6 @@
               <a:rPr lang="nl-BE" baseline="0" dirty="0" smtClean="0"/>
               <a:t>=&gt; Low coupling</a:t>
             </a:r>
-            <a:endParaRPr lang="nl-BE" baseline="0" dirty="0" smtClean="0"/>
           </a:p>
           <a:p>
             <a:endParaRPr lang="nl-BE" baseline="0" dirty="0" smtClean="0"/>
@@ -1499,11 +1486,7 @@
           <a:p>
             <a:r>
               <a:rPr lang="nl-BE" sz="800" dirty="0" smtClean="0"/>
-              <a:t>Project </a:t>
-            </a:r>
-            <a:r>
-              <a:rPr lang="nl-BE" sz="800" dirty="0" smtClean="0"/>
-              <a:t>+ Subsystems</a:t>
+              <a:t>Project + Subsystems</a:t>
             </a:r>
           </a:p>
           <a:p>
@@ -1821,11 +1804,7 @@
             </a:r>
             <a:r>
               <a:rPr lang="nl-BE" baseline="0" dirty="0" smtClean="0"/>
-              <a:t> </a:t>
-            </a:r>
-            <a:r>
-              <a:rPr lang="nl-BE" baseline="0" dirty="0" smtClean="0"/>
-              <a:t>Permissions interaction</a:t>
+              <a:t> Permissions interaction</a:t>
             </a:r>
           </a:p>
           <a:p>
@@ -2320,11 +2299,7 @@
             </a:r>
             <a:r>
               <a:rPr lang="nl-BE" baseline="0" dirty="0" smtClean="0"/>
-              <a:t> </a:t>
-            </a:r>
-            <a:r>
-              <a:rPr lang="nl-BE" baseline="0" dirty="0" smtClean="0"/>
-              <a:t>Scenario’s; Interaction from UI and How DataModel fits in.</a:t>
+              <a:t> Scenario’s; Interaction from UI and How DataModel fits in.</a:t>
             </a:r>
           </a:p>
           <a:p>
@@ -2795,7 +2770,7 @@
           <a:p>
             <a:fld id="{3FF3D4C3-34CD-4E7E-97F9-86F6D58F3628}" type="datetimeFigureOut">
               <a:rPr lang="nl-BE" smtClean="0"/>
-              <a:t>14/03/16</a:t>
+              <a:t>15/03/2016</a:t>
             </a:fld>
             <a:endParaRPr lang="nl-BE"/>
           </a:p>
@@ -2837,7 +2812,7 @@
           <a:p>
             <a:fld id="{1388032C-26F7-45D2-BF4B-5C7971A85815}" type="slidenum">
               <a:rPr lang="nl-BE" smtClean="0"/>
-              <a:t>‹nr.›</a:t>
+              <a:t>‹#›</a:t>
             </a:fld>
             <a:endParaRPr lang="nl-BE"/>
           </a:p>
@@ -3003,7 +2978,7 @@
           <a:p>
             <a:fld id="{3FF3D4C3-34CD-4E7E-97F9-86F6D58F3628}" type="datetimeFigureOut">
               <a:rPr lang="nl-BE" smtClean="0"/>
-              <a:t>14/03/16</a:t>
+              <a:t>15/03/2016</a:t>
             </a:fld>
             <a:endParaRPr lang="nl-BE"/>
           </a:p>
@@ -3045,7 +3020,7 @@
           <a:p>
             <a:fld id="{1388032C-26F7-45D2-BF4B-5C7971A85815}" type="slidenum">
               <a:rPr lang="nl-BE" smtClean="0"/>
-              <a:t>‹nr.›</a:t>
+              <a:t>‹#›</a:t>
             </a:fld>
             <a:endParaRPr lang="nl-BE"/>
           </a:p>
@@ -3259,7 +3234,7 @@
           <a:p>
             <a:fld id="{3FF3D4C3-34CD-4E7E-97F9-86F6D58F3628}" type="datetimeFigureOut">
               <a:rPr lang="nl-BE" smtClean="0"/>
-              <a:t>14/03/16</a:t>
+              <a:t>15/03/2016</a:t>
             </a:fld>
             <a:endParaRPr lang="nl-BE"/>
           </a:p>
@@ -3301,7 +3276,7 @@
           <a:p>
             <a:fld id="{1388032C-26F7-45D2-BF4B-5C7971A85815}" type="slidenum">
               <a:rPr lang="nl-BE" smtClean="0"/>
-              <a:t>‹nr.›</a:t>
+              <a:t>‹#›</a:t>
             </a:fld>
             <a:endParaRPr lang="nl-BE"/>
           </a:p>
@@ -3429,7 +3404,7 @@
           <a:p>
             <a:fld id="{3FF3D4C3-34CD-4E7E-97F9-86F6D58F3628}" type="datetimeFigureOut">
               <a:rPr lang="nl-BE" smtClean="0"/>
-              <a:t>14/03/16</a:t>
+              <a:t>15/03/2016</a:t>
             </a:fld>
             <a:endParaRPr lang="nl-BE"/>
           </a:p>
@@ -3471,7 +3446,7 @@
           <a:p>
             <a:fld id="{1388032C-26F7-45D2-BF4B-5C7971A85815}" type="slidenum">
               <a:rPr lang="nl-BE" smtClean="0"/>
-              <a:t>‹nr.›</a:t>
+              <a:t>‹#›</a:t>
             </a:fld>
             <a:endParaRPr lang="nl-BE"/>
           </a:p>
@@ -3772,7 +3747,7 @@
           <a:p>
             <a:fld id="{3FF3D4C3-34CD-4E7E-97F9-86F6D58F3628}" type="datetimeFigureOut">
               <a:rPr lang="nl-BE" smtClean="0"/>
-              <a:t>14/03/16</a:t>
+              <a:t>15/03/2016</a:t>
             </a:fld>
             <a:endParaRPr lang="nl-BE"/>
           </a:p>
@@ -3814,7 +3789,7 @@
           <a:p>
             <a:fld id="{1388032C-26F7-45D2-BF4B-5C7971A85815}" type="slidenum">
               <a:rPr lang="nl-BE" smtClean="0"/>
-              <a:t>‹nr.›</a:t>
+              <a:t>‹#›</a:t>
             </a:fld>
             <a:endParaRPr lang="nl-BE"/>
           </a:p>
@@ -4047,7 +4022,7 @@
           <a:p>
             <a:fld id="{3FF3D4C3-34CD-4E7E-97F9-86F6D58F3628}" type="datetimeFigureOut">
               <a:rPr lang="nl-BE" smtClean="0"/>
-              <a:t>14/03/16</a:t>
+              <a:t>15/03/2016</a:t>
             </a:fld>
             <a:endParaRPr lang="nl-BE"/>
           </a:p>
@@ -4089,7 +4064,7 @@
           <a:p>
             <a:fld id="{1388032C-26F7-45D2-BF4B-5C7971A85815}" type="slidenum">
               <a:rPr lang="nl-BE" smtClean="0"/>
-              <a:t>‹nr.›</a:t>
+              <a:t>‹#›</a:t>
             </a:fld>
             <a:endParaRPr lang="nl-BE"/>
           </a:p>
@@ -4426,7 +4401,7 @@
           <a:p>
             <a:fld id="{3FF3D4C3-34CD-4E7E-97F9-86F6D58F3628}" type="datetimeFigureOut">
               <a:rPr lang="nl-BE" smtClean="0"/>
-              <a:t>14/03/16</a:t>
+              <a:t>15/03/2016</a:t>
             </a:fld>
             <a:endParaRPr lang="nl-BE"/>
           </a:p>
@@ -4468,7 +4443,7 @@
           <a:p>
             <a:fld id="{1388032C-26F7-45D2-BF4B-5C7971A85815}" type="slidenum">
               <a:rPr lang="nl-BE" smtClean="0"/>
-              <a:t>‹nr.›</a:t>
+              <a:t>‹#›</a:t>
             </a:fld>
             <a:endParaRPr lang="nl-BE"/>
           </a:p>
@@ -4544,7 +4519,7 @@
           <a:p>
             <a:fld id="{3FF3D4C3-34CD-4E7E-97F9-86F6D58F3628}" type="datetimeFigureOut">
               <a:rPr lang="nl-BE" smtClean="0"/>
-              <a:t>14/03/16</a:t>
+              <a:t>15/03/2016</a:t>
             </a:fld>
             <a:endParaRPr lang="nl-BE"/>
           </a:p>
@@ -4586,7 +4561,7 @@
           <a:p>
             <a:fld id="{1388032C-26F7-45D2-BF4B-5C7971A85815}" type="slidenum">
               <a:rPr lang="nl-BE" smtClean="0"/>
-              <a:t>‹nr.›</a:t>
+              <a:t>‹#›</a:t>
             </a:fld>
             <a:endParaRPr lang="nl-BE"/>
           </a:p>
@@ -4715,7 +4690,7 @@
           <a:p>
             <a:fld id="{3FF3D4C3-34CD-4E7E-97F9-86F6D58F3628}" type="datetimeFigureOut">
               <a:rPr lang="nl-BE" smtClean="0"/>
-              <a:t>14/03/16</a:t>
+              <a:t>15/03/2016</a:t>
             </a:fld>
             <a:endParaRPr lang="nl-BE"/>
           </a:p>
@@ -4765,7 +4740,7 @@
           <a:p>
             <a:fld id="{1388032C-26F7-45D2-BF4B-5C7971A85815}" type="slidenum">
               <a:rPr lang="nl-BE" smtClean="0"/>
-              <a:t>‹nr.›</a:t>
+              <a:t>‹#›</a:t>
             </a:fld>
             <a:endParaRPr lang="nl-BE"/>
           </a:p>
@@ -5069,7 +5044,7 @@
           <a:p>
             <a:fld id="{3FF3D4C3-34CD-4E7E-97F9-86F6D58F3628}" type="datetimeFigureOut">
               <a:rPr lang="nl-BE" smtClean="0"/>
-              <a:t>14/03/16</a:t>
+              <a:t>15/03/2016</a:t>
             </a:fld>
             <a:endParaRPr lang="nl-BE"/>
           </a:p>
@@ -5132,7 +5107,7 @@
           <a:p>
             <a:fld id="{1388032C-26F7-45D2-BF4B-5C7971A85815}" type="slidenum">
               <a:rPr lang="nl-BE" smtClean="0"/>
-              <a:t>‹nr.›</a:t>
+              <a:t>‹#›</a:t>
             </a:fld>
             <a:endParaRPr lang="nl-BE"/>
           </a:p>
@@ -5446,7 +5421,7 @@
           <a:p>
             <a:fld id="{3FF3D4C3-34CD-4E7E-97F9-86F6D58F3628}" type="datetimeFigureOut">
               <a:rPr lang="nl-BE" smtClean="0"/>
-              <a:t>14/03/16</a:t>
+              <a:t>15/03/2016</a:t>
             </a:fld>
             <a:endParaRPr lang="nl-BE"/>
           </a:p>
@@ -5488,7 +5463,7 @@
           <a:p>
             <a:fld id="{1388032C-26F7-45D2-BF4B-5C7971A85815}" type="slidenum">
               <a:rPr lang="nl-BE" smtClean="0"/>
-              <a:t>‹nr.›</a:t>
+              <a:t>‹#›</a:t>
             </a:fld>
             <a:endParaRPr lang="nl-BE"/>
           </a:p>
@@ -5733,7 +5708,7 @@
           <a:p>
             <a:fld id="{3FF3D4C3-34CD-4E7E-97F9-86F6D58F3628}" type="datetimeFigureOut">
               <a:rPr lang="nl-BE" smtClean="0"/>
-              <a:t>14/03/16</a:t>
+              <a:t>15/03/2016</a:t>
             </a:fld>
             <a:endParaRPr lang="nl-BE"/>
           </a:p>
@@ -5807,7 +5782,7 @@
           <a:p>
             <a:fld id="{1388032C-26F7-45D2-BF4B-5C7971A85815}" type="slidenum">
               <a:rPr lang="nl-BE" smtClean="0"/>
-              <a:t>‹nr.›</a:t>
+              <a:t>‹#›</a:t>
             </a:fld>
             <a:endParaRPr lang="nl-BE"/>
           </a:p>
@@ -6617,11 +6592,11 @@
   <p:clrMapOvr>
     <a:masterClrMapping/>
   </p:clrMapOvr>
-  <mc:AlternateContent xmlns:mc="http://schemas.openxmlformats.org/markup-compatibility/2006">
-    <mc:Choice xmlns:p14="http://schemas.microsoft.com/office/powerpoint/2010/main" Requires="p14">
+  <mc:AlternateContent xmlns:mc="http://schemas.openxmlformats.org/markup-compatibility/2006" xmlns:p14="http://schemas.microsoft.com/office/powerpoint/2010/main">
+    <mc:Choice Requires="p14">
       <p:transition spd="slow" p14:dur="2000"/>
     </mc:Choice>
-    <mc:Fallback>
+    <mc:Fallback xmlns="">
       <p:transition spd="slow"/>
     </mc:Fallback>
   </mc:AlternateContent>
@@ -6771,47 +6746,8 @@
           <a:lstStyle/>
           <a:p>
             <a:r>
-              <a:rPr lang="nl-BE" dirty="0" smtClean="0"/>
+              <a:rPr lang="nl-BE" dirty="0" err="1" smtClean="0"/>
               <a:t>TimeTable</a:t>
-            </a:r>
-            <a:endParaRPr lang="nl-BE" dirty="0"/>
-          </a:p>
-        </p:txBody>
-      </p:sp>
-      <p:sp>
-        <p:nvSpPr>
-          <p:cNvPr id="3" name="Content Placeholder 2"/>
-          <p:cNvSpPr>
-            <a:spLocks noGrp="1"/>
-          </p:cNvSpPr>
-          <p:nvPr>
-            <p:ph idx="1"/>
-          </p:nvPr>
-        </p:nvSpPr>
-        <p:spPr>
-          <a:xfrm>
-            <a:off x="457200" y="1600201"/>
-            <a:ext cx="8229600" cy="2188840"/>
-          </a:xfrm>
-        </p:spPr>
-        <p:txBody>
-          <a:bodyPr>
-            <a:normAutofit/>
-          </a:bodyPr>
-          <a:lstStyle/>
-          <a:p>
-            <a:r>
-              <a:rPr lang="nl-BE" dirty="0" smtClean="0"/>
-              <a:t>TODO Add Uurbestuding hier!!</a:t>
-            </a:r>
-          </a:p>
-          <a:p>
-            <a:endParaRPr lang="nl-BE" dirty="0"/>
-          </a:p>
-          <a:p>
-            <a:r>
-              <a:rPr lang="nl-BE" dirty="0" smtClean="0"/>
-              <a:t>Enkel totaal overzicht. NIET UITLEGGEN tijdens presentatie.</a:t>
             </a:r>
             <a:endParaRPr lang="nl-BE" dirty="0"/>
           </a:p>
@@ -7041,6 +6977,553 @@
           </a:p>
         </p:txBody>
       </p:sp>
+      <p:graphicFrame>
+        <p:nvGraphicFramePr>
+          <p:cNvPr id="7" name="Content Placeholder 6"/>
+          <p:cNvGraphicFramePr>
+            <a:graphicFrameLocks noGrp="1"/>
+          </p:cNvGraphicFramePr>
+          <p:nvPr>
+            <p:ph idx="1"/>
+            <p:extLst>
+              <p:ext uri="{D42A27DB-BD31-4B8C-83A1-F6EECF244321}">
+                <p14:modId xmlns:p14="http://schemas.microsoft.com/office/powerpoint/2010/main" val="113879438"/>
+              </p:ext>
+            </p:extLst>
+          </p:nvPr>
+        </p:nvGraphicFramePr>
+        <p:xfrm>
+          <a:off x="3154700" y="2142117"/>
+          <a:ext cx="2880320" cy="1358891"/>
+        </p:xfrm>
+        <a:graphic>
+          <a:graphicData uri="http://schemas.openxmlformats.org/drawingml/2006/table">
+            <a:tbl>
+              <a:tblPr>
+                <a:tableStyleId>{5C22544A-7EE6-4342-B048-85BDC9FD1C3A}</a:tableStyleId>
+              </a:tblPr>
+              <a:tblGrid>
+                <a:gridCol w="659694"/>
+                <a:gridCol w="757236"/>
+                <a:gridCol w="731695"/>
+                <a:gridCol w="731695"/>
+              </a:tblGrid>
+              <a:tr h="377767">
+                <a:tc>
+                  <a:txBody>
+                    <a:bodyPr/>
+                    <a:lstStyle/>
+                    <a:p>
+                      <a:pPr marL="0" marR="0" indent="0" algn="l" defTabSz="914400" rtl="0" eaLnBrk="1" fontAlgn="b" latinLnBrk="0" hangingPunct="1">
+                        <a:lnSpc>
+                          <a:spcPct val="100000"/>
+                        </a:lnSpc>
+                        <a:spcBef>
+                          <a:spcPts val="0"/>
+                        </a:spcBef>
+                        <a:spcAft>
+                          <a:spcPts val="0"/>
+                        </a:spcAft>
+                        <a:buClrTx/>
+                        <a:buSzTx/>
+                        <a:buFontTx/>
+                        <a:buNone/>
+                        <a:tabLst/>
+                        <a:defRPr/>
+                      </a:pPr>
+                      <a:r>
+                        <a:rPr lang="nl-BE" sz="1100" u="none" strike="noStrike" dirty="0" smtClean="0">
+                          <a:effectLst/>
+                        </a:rPr>
+                        <a:t>iteration</a:t>
+                      </a:r>
+                      <a:endParaRPr lang="nl-BE" sz="1100" b="0" i="0" u="none" strike="noStrike" dirty="0" smtClean="0">
+                        <a:solidFill>
+                          <a:srgbClr val="FFFFFF"/>
+                        </a:solidFill>
+                        <a:effectLst/>
+                        <a:latin typeface="Calibri" panose="020F0502020204030204" pitchFamily="34" charset="0"/>
+                      </a:endParaRPr>
+                    </a:p>
+                  </a:txBody>
+                  <a:tcPr marL="9525" marR="9525" marT="9525" marB="0" anchor="ctr">
+                    <a:solidFill>
+                      <a:schemeClr val="accent1"/>
+                    </a:solidFill>
+                  </a:tcPr>
+                </a:tc>
+                <a:tc>
+                  <a:txBody>
+                    <a:bodyPr/>
+                    <a:lstStyle/>
+                    <a:p>
+                      <a:pPr algn="ctr" fontAlgn="ctr"/>
+                      <a:r>
+                        <a:rPr lang="nl-BE" sz="1100" u="none" strike="noStrike" dirty="0">
+                          <a:effectLst/>
+                        </a:rPr>
+                        <a:t>1</a:t>
+                      </a:r>
+                      <a:endParaRPr lang="nl-BE" sz="1100" b="0" i="0" u="none" strike="noStrike" dirty="0">
+                        <a:solidFill>
+                          <a:srgbClr val="FFFFFF"/>
+                        </a:solidFill>
+                        <a:effectLst/>
+                        <a:latin typeface="Calibri" panose="020F0502020204030204" pitchFamily="34" charset="0"/>
+                      </a:endParaRPr>
+                    </a:p>
+                  </a:txBody>
+                  <a:tcPr marL="9525" marR="9525" marT="9525" marB="0" anchor="ctr">
+                    <a:solidFill>
+                      <a:schemeClr val="accent1"/>
+                    </a:solidFill>
+                  </a:tcPr>
+                </a:tc>
+                <a:tc>
+                  <a:txBody>
+                    <a:bodyPr/>
+                    <a:lstStyle/>
+                    <a:p>
+                      <a:pPr algn="ctr" fontAlgn="ctr"/>
+                      <a:r>
+                        <a:rPr lang="nl-BE" sz="1100" u="none" strike="noStrike" dirty="0">
+                          <a:effectLst/>
+                        </a:rPr>
+                        <a:t>2</a:t>
+                      </a:r>
+                      <a:endParaRPr lang="nl-BE" sz="1100" b="0" i="0" u="none" strike="noStrike" dirty="0">
+                        <a:solidFill>
+                          <a:srgbClr val="FFFFFF"/>
+                        </a:solidFill>
+                        <a:effectLst/>
+                        <a:latin typeface="Calibri" panose="020F0502020204030204" pitchFamily="34" charset="0"/>
+                      </a:endParaRPr>
+                    </a:p>
+                  </a:txBody>
+                  <a:tcPr marL="9525" marR="9525" marT="9525" marB="0" anchor="ctr">
+                    <a:solidFill>
+                      <a:schemeClr val="accent1"/>
+                    </a:solidFill>
+                  </a:tcPr>
+                </a:tc>
+                <a:tc>
+                  <a:txBody>
+                    <a:bodyPr/>
+                    <a:lstStyle/>
+                    <a:p>
+                      <a:pPr algn="ctr" fontAlgn="ctr"/>
+                      <a:r>
+                        <a:rPr lang="nl-BE" sz="1100" u="none" strike="noStrike" dirty="0">
+                          <a:effectLst/>
+                        </a:rPr>
+                        <a:t>3</a:t>
+                      </a:r>
+                      <a:endParaRPr lang="nl-BE" sz="1100" b="0" i="0" u="none" strike="noStrike" dirty="0">
+                        <a:solidFill>
+                          <a:srgbClr val="FFFFFF"/>
+                        </a:solidFill>
+                        <a:effectLst/>
+                        <a:latin typeface="Calibri" panose="020F0502020204030204" pitchFamily="34" charset="0"/>
+                      </a:endParaRPr>
+                    </a:p>
+                  </a:txBody>
+                  <a:tcPr marL="9525" marR="9525" marT="9525" marB="0" anchor="ctr">
+                    <a:solidFill>
+                      <a:schemeClr val="accent1"/>
+                    </a:solidFill>
+                  </a:tcPr>
+                </a:tc>
+              </a:tr>
+              <a:tr h="245281">
+                <a:tc>
+                  <a:txBody>
+                    <a:bodyPr/>
+                    <a:lstStyle/>
+                    <a:p>
+                      <a:pPr algn="l" fontAlgn="b"/>
+                      <a:r>
+                        <a:rPr lang="nl-BE" sz="1100" u="none" strike="noStrike" dirty="0">
+                          <a:effectLst/>
+                        </a:rPr>
+                        <a:t>ben</a:t>
+                      </a:r>
+                      <a:endParaRPr lang="nl-BE" sz="1100" b="0" i="0" u="none" strike="noStrike" dirty="0">
+                        <a:solidFill>
+                          <a:srgbClr val="FFFFFF"/>
+                        </a:solidFill>
+                        <a:effectLst/>
+                        <a:latin typeface="Calibri" panose="020F0502020204030204" pitchFamily="34" charset="0"/>
+                      </a:endParaRPr>
+                    </a:p>
+                  </a:txBody>
+                  <a:tcPr marL="9525" marR="9525" marT="9525" marB="0" anchor="b">
+                    <a:solidFill>
+                      <a:schemeClr val="accent1">
+                        <a:lumMod val="60000"/>
+                        <a:lumOff val="40000"/>
+                      </a:schemeClr>
+                    </a:solidFill>
+                  </a:tcPr>
+                </a:tc>
+                <a:tc>
+                  <a:txBody>
+                    <a:bodyPr/>
+                    <a:lstStyle/>
+                    <a:p>
+                      <a:pPr algn="r" fontAlgn="b"/>
+                      <a:r>
+                        <a:rPr lang="nl-BE" sz="1100" u="none" strike="noStrike">
+                          <a:effectLst/>
+                        </a:rPr>
+                        <a:t>109:50</a:t>
+                      </a:r>
+                      <a:endParaRPr lang="nl-BE" sz="1100" b="0" i="0" u="none" strike="noStrike">
+                        <a:solidFill>
+                          <a:srgbClr val="000000"/>
+                        </a:solidFill>
+                        <a:effectLst/>
+                        <a:latin typeface="Calibri" panose="020F0502020204030204" pitchFamily="34" charset="0"/>
+                      </a:endParaRPr>
+                    </a:p>
+                  </a:txBody>
+                  <a:tcPr marL="9525" marR="9525" marT="9525" marB="0" anchor="b"/>
+                </a:tc>
+                <a:tc>
+                  <a:txBody>
+                    <a:bodyPr/>
+                    <a:lstStyle/>
+                    <a:p>
+                      <a:pPr algn="l" fontAlgn="b"/>
+                      <a:endParaRPr lang="nl-BE" sz="1100" b="0" i="0" u="none" strike="noStrike">
+                        <a:solidFill>
+                          <a:srgbClr val="000000"/>
+                        </a:solidFill>
+                        <a:effectLst/>
+                        <a:latin typeface="Calibri" panose="020F0502020204030204" pitchFamily="34" charset="0"/>
+                      </a:endParaRPr>
+                    </a:p>
+                  </a:txBody>
+                  <a:tcPr marL="9525" marR="9525" marT="9525" marB="0" anchor="b"/>
+                </a:tc>
+                <a:tc>
+                  <a:txBody>
+                    <a:bodyPr/>
+                    <a:lstStyle/>
+                    <a:p>
+                      <a:pPr algn="l" fontAlgn="b"/>
+                      <a:endParaRPr lang="nl-BE" sz="1100" b="0" i="0" u="none" strike="noStrike">
+                        <a:solidFill>
+                          <a:srgbClr val="000000"/>
+                        </a:solidFill>
+                        <a:effectLst/>
+                        <a:latin typeface="Calibri" panose="020F0502020204030204" pitchFamily="34" charset="0"/>
+                      </a:endParaRPr>
+                    </a:p>
+                  </a:txBody>
+                  <a:tcPr marL="9525" marR="9525" marT="9525" marB="0" anchor="b"/>
+                </a:tc>
+              </a:tr>
+              <a:tr h="245281">
+                <a:tc>
+                  <a:txBody>
+                    <a:bodyPr/>
+                    <a:lstStyle/>
+                    <a:p>
+                      <a:pPr algn="l" fontAlgn="b"/>
+                      <a:r>
+                        <a:rPr lang="nl-BE" sz="1100" u="none" strike="noStrike" dirty="0" err="1">
+                          <a:effectLst/>
+                        </a:rPr>
+                        <a:t>vincent</a:t>
+                      </a:r>
+                      <a:endParaRPr lang="nl-BE" sz="1100" b="0" i="0" u="none" strike="noStrike" dirty="0">
+                        <a:solidFill>
+                          <a:srgbClr val="FFFFFF"/>
+                        </a:solidFill>
+                        <a:effectLst/>
+                        <a:latin typeface="Calibri" panose="020F0502020204030204" pitchFamily="34" charset="0"/>
+                      </a:endParaRPr>
+                    </a:p>
+                  </a:txBody>
+                  <a:tcPr marL="9525" marR="9525" marT="9525" marB="0" anchor="b">
+                    <a:solidFill>
+                      <a:schemeClr val="accent1">
+                        <a:lumMod val="60000"/>
+                        <a:lumOff val="40000"/>
+                      </a:schemeClr>
+                    </a:solidFill>
+                  </a:tcPr>
+                </a:tc>
+                <a:tc>
+                  <a:txBody>
+                    <a:bodyPr/>
+                    <a:lstStyle/>
+                    <a:p>
+                      <a:pPr algn="r" fontAlgn="b"/>
+                      <a:r>
+                        <a:rPr lang="nl-BE" sz="1100" u="none" strike="noStrike">
+                          <a:effectLst/>
+                        </a:rPr>
+                        <a:t>107:05</a:t>
+                      </a:r>
+                      <a:endParaRPr lang="nl-BE" sz="1100" b="0" i="0" u="none" strike="noStrike">
+                        <a:solidFill>
+                          <a:srgbClr val="000000"/>
+                        </a:solidFill>
+                        <a:effectLst/>
+                        <a:latin typeface="Calibri" panose="020F0502020204030204" pitchFamily="34" charset="0"/>
+                      </a:endParaRPr>
+                    </a:p>
+                  </a:txBody>
+                  <a:tcPr marL="9525" marR="9525" marT="9525" marB="0" anchor="b"/>
+                </a:tc>
+                <a:tc>
+                  <a:txBody>
+                    <a:bodyPr/>
+                    <a:lstStyle/>
+                    <a:p>
+                      <a:pPr algn="l" fontAlgn="b"/>
+                      <a:endParaRPr lang="nl-BE" sz="1100" b="0" i="0" u="none" strike="noStrike">
+                        <a:solidFill>
+                          <a:srgbClr val="000000"/>
+                        </a:solidFill>
+                        <a:effectLst/>
+                        <a:latin typeface="Calibri" panose="020F0502020204030204" pitchFamily="34" charset="0"/>
+                      </a:endParaRPr>
+                    </a:p>
+                  </a:txBody>
+                  <a:tcPr marL="9525" marR="9525" marT="9525" marB="0" anchor="b"/>
+                </a:tc>
+                <a:tc>
+                  <a:txBody>
+                    <a:bodyPr/>
+                    <a:lstStyle/>
+                    <a:p>
+                      <a:pPr algn="l" fontAlgn="b"/>
+                      <a:endParaRPr lang="nl-BE" sz="1100" b="0" i="0" u="none" strike="noStrike">
+                        <a:solidFill>
+                          <a:srgbClr val="000000"/>
+                        </a:solidFill>
+                        <a:effectLst/>
+                        <a:latin typeface="Calibri" panose="020F0502020204030204" pitchFamily="34" charset="0"/>
+                      </a:endParaRPr>
+                    </a:p>
+                  </a:txBody>
+                  <a:tcPr marL="9525" marR="9525" marT="9525" marB="0" anchor="b"/>
+                </a:tc>
+              </a:tr>
+              <a:tr h="245281">
+                <a:tc>
+                  <a:txBody>
+                    <a:bodyPr/>
+                    <a:lstStyle/>
+                    <a:p>
+                      <a:pPr algn="l" fontAlgn="b"/>
+                      <a:r>
+                        <a:rPr lang="nl-BE" sz="1100" u="none" strike="noStrike" dirty="0" err="1">
+                          <a:effectLst/>
+                        </a:rPr>
+                        <a:t>mathias</a:t>
+                      </a:r>
+                      <a:endParaRPr lang="nl-BE" sz="1100" b="0" i="0" u="none" strike="noStrike" dirty="0">
+                        <a:solidFill>
+                          <a:srgbClr val="FFFFFF"/>
+                        </a:solidFill>
+                        <a:effectLst/>
+                        <a:latin typeface="Calibri" panose="020F0502020204030204" pitchFamily="34" charset="0"/>
+                      </a:endParaRPr>
+                    </a:p>
+                  </a:txBody>
+                  <a:tcPr marL="9525" marR="9525" marT="9525" marB="0" anchor="b">
+                    <a:solidFill>
+                      <a:schemeClr val="accent1">
+                        <a:lumMod val="60000"/>
+                        <a:lumOff val="40000"/>
+                      </a:schemeClr>
+                    </a:solidFill>
+                  </a:tcPr>
+                </a:tc>
+                <a:tc>
+                  <a:txBody>
+                    <a:bodyPr/>
+                    <a:lstStyle/>
+                    <a:p>
+                      <a:pPr algn="r" fontAlgn="b"/>
+                      <a:r>
+                        <a:rPr lang="nl-BE" sz="1100" u="none" strike="noStrike">
+                          <a:effectLst/>
+                        </a:rPr>
+                        <a:t>73:45</a:t>
+                      </a:r>
+                      <a:endParaRPr lang="nl-BE" sz="1100" b="0" i="0" u="none" strike="noStrike">
+                        <a:solidFill>
+                          <a:srgbClr val="000000"/>
+                        </a:solidFill>
+                        <a:effectLst/>
+                        <a:latin typeface="Calibri" panose="020F0502020204030204" pitchFamily="34" charset="0"/>
+                      </a:endParaRPr>
+                    </a:p>
+                  </a:txBody>
+                  <a:tcPr marL="9525" marR="9525" marT="9525" marB="0" anchor="b"/>
+                </a:tc>
+                <a:tc>
+                  <a:txBody>
+                    <a:bodyPr/>
+                    <a:lstStyle/>
+                    <a:p>
+                      <a:pPr algn="l" fontAlgn="b"/>
+                      <a:endParaRPr lang="nl-BE" sz="1100" b="0" i="0" u="none" strike="noStrike">
+                        <a:solidFill>
+                          <a:srgbClr val="000000"/>
+                        </a:solidFill>
+                        <a:effectLst/>
+                        <a:latin typeface="Calibri" panose="020F0502020204030204" pitchFamily="34" charset="0"/>
+                      </a:endParaRPr>
+                    </a:p>
+                  </a:txBody>
+                  <a:tcPr marL="9525" marR="9525" marT="9525" marB="0" anchor="b"/>
+                </a:tc>
+                <a:tc>
+                  <a:txBody>
+                    <a:bodyPr/>
+                    <a:lstStyle/>
+                    <a:p>
+                      <a:pPr algn="l" fontAlgn="b"/>
+                      <a:endParaRPr lang="nl-BE" sz="1100" b="0" i="0" u="none" strike="noStrike">
+                        <a:solidFill>
+                          <a:srgbClr val="000000"/>
+                        </a:solidFill>
+                        <a:effectLst/>
+                        <a:latin typeface="Calibri" panose="020F0502020204030204" pitchFamily="34" charset="0"/>
+                      </a:endParaRPr>
+                    </a:p>
+                  </a:txBody>
+                  <a:tcPr marL="9525" marR="9525" marT="9525" marB="0" anchor="b"/>
+                </a:tc>
+              </a:tr>
+              <a:tr h="245281">
+                <a:tc>
+                  <a:txBody>
+                    <a:bodyPr/>
+                    <a:lstStyle/>
+                    <a:p>
+                      <a:pPr algn="l" fontAlgn="b"/>
+                      <a:r>
+                        <a:rPr lang="nl-BE" sz="1100" u="none" strike="noStrike" dirty="0">
+                          <a:effectLst/>
+                        </a:rPr>
+                        <a:t>kwinten</a:t>
+                      </a:r>
+                      <a:endParaRPr lang="nl-BE" sz="1100" b="0" i="0" u="none" strike="noStrike" dirty="0">
+                        <a:solidFill>
+                          <a:srgbClr val="FFFFFF"/>
+                        </a:solidFill>
+                        <a:effectLst/>
+                        <a:latin typeface="Calibri" panose="020F0502020204030204" pitchFamily="34" charset="0"/>
+                      </a:endParaRPr>
+                    </a:p>
+                  </a:txBody>
+                  <a:tcPr marL="9525" marR="9525" marT="9525" marB="0" anchor="b">
+                    <a:solidFill>
+                      <a:schemeClr val="accent1">
+                        <a:lumMod val="60000"/>
+                        <a:lumOff val="40000"/>
+                      </a:schemeClr>
+                    </a:solidFill>
+                  </a:tcPr>
+                </a:tc>
+                <a:tc>
+                  <a:txBody>
+                    <a:bodyPr/>
+                    <a:lstStyle/>
+                    <a:p>
+                      <a:pPr algn="r" fontAlgn="b"/>
+                      <a:r>
+                        <a:rPr lang="nl-BE" sz="1100" u="none" strike="noStrike">
+                          <a:effectLst/>
+                        </a:rPr>
+                        <a:t>62:15</a:t>
+                      </a:r>
+                      <a:endParaRPr lang="nl-BE" sz="1100" b="0" i="0" u="none" strike="noStrike">
+                        <a:solidFill>
+                          <a:srgbClr val="000000"/>
+                        </a:solidFill>
+                        <a:effectLst/>
+                        <a:latin typeface="Calibri" panose="020F0502020204030204" pitchFamily="34" charset="0"/>
+                      </a:endParaRPr>
+                    </a:p>
+                  </a:txBody>
+                  <a:tcPr marL="9525" marR="9525" marT="9525" marB="0" anchor="b"/>
+                </a:tc>
+                <a:tc>
+                  <a:txBody>
+                    <a:bodyPr/>
+                    <a:lstStyle/>
+                    <a:p>
+                      <a:pPr algn="l" fontAlgn="b"/>
+                      <a:endParaRPr lang="nl-BE" sz="1100" b="0" i="0" u="none" strike="noStrike">
+                        <a:solidFill>
+                          <a:srgbClr val="000000"/>
+                        </a:solidFill>
+                        <a:effectLst/>
+                        <a:latin typeface="Calibri" panose="020F0502020204030204" pitchFamily="34" charset="0"/>
+                      </a:endParaRPr>
+                    </a:p>
+                  </a:txBody>
+                  <a:tcPr marL="9525" marR="9525" marT="9525" marB="0" anchor="b"/>
+                </a:tc>
+                <a:tc>
+                  <a:txBody>
+                    <a:bodyPr/>
+                    <a:lstStyle/>
+                    <a:p>
+                      <a:pPr algn="l" fontAlgn="b"/>
+                      <a:endParaRPr lang="nl-BE" sz="1100" b="0" i="0" u="none" strike="noStrike" dirty="0">
+                        <a:solidFill>
+                          <a:srgbClr val="000000"/>
+                        </a:solidFill>
+                        <a:effectLst/>
+                        <a:latin typeface="Calibri" panose="020F0502020204030204" pitchFamily="34" charset="0"/>
+                      </a:endParaRPr>
+                    </a:p>
+                  </a:txBody>
+                  <a:tcPr marL="9525" marR="9525" marT="9525" marB="0" anchor="b"/>
+                </a:tc>
+              </a:tr>
+            </a:tbl>
+          </a:graphicData>
+        </a:graphic>
+      </p:graphicFrame>
+      <p:sp>
+        <p:nvSpPr>
+          <p:cNvPr id="8" name="TextBox 7"/>
+          <p:cNvSpPr txBox="1"/>
+          <p:nvPr/>
+        </p:nvSpPr>
+        <p:spPr>
+          <a:xfrm>
+            <a:off x="6156176" y="3203669"/>
+            <a:ext cx="970137" cy="369332"/>
+          </a:xfrm>
+          <a:prstGeom prst="rect">
+            <a:avLst/>
+          </a:prstGeom>
+          <a:noFill/>
+        </p:spPr>
+        <p:txBody>
+          <a:bodyPr wrap="none" rtlCol="0">
+            <a:spAutoFit/>
+          </a:bodyPr>
+          <a:lstStyle/>
+          <a:p>
+            <a:r>
+              <a:rPr lang="nl-BE" dirty="0" smtClean="0"/>
+              <a:t>In h:mm</a:t>
+            </a:r>
+            <a:endParaRPr lang="nl-BE" dirty="0"/>
+          </a:p>
+        </p:txBody>
+      </p:sp>
     </p:spTree>
     <p:extLst>
       <p:ext uri="{BB962C8B-B14F-4D97-AF65-F5344CB8AC3E}">
@@ -7137,11 +7620,11 @@
   <p:clrMapOvr>
     <a:masterClrMapping/>
   </p:clrMapOvr>
-  <mc:AlternateContent xmlns:mc="http://schemas.openxmlformats.org/markup-compatibility/2006">
-    <mc:Choice xmlns:p14="http://schemas.microsoft.com/office/powerpoint/2010/main" Requires="p14">
+  <mc:AlternateContent xmlns:mc="http://schemas.openxmlformats.org/markup-compatibility/2006" xmlns:p14="http://schemas.microsoft.com/office/powerpoint/2010/main">
+    <mc:Choice Requires="p14">
       <p:transition spd="slow" p14:dur="2000"/>
     </mc:Choice>
-    <mc:Fallback>
+    <mc:Fallback xmlns="">
       <p:transition spd="slow"/>
     </mc:Fallback>
   </mc:AlternateContent>

</xml_diff>